<commit_message>
Finalized documents, uploaded video presentation
</commit_message>
<xml_diff>
--- a/Melissa Mullen Final Project.pptx
+++ b/Melissa Mullen Final Project.pptx
@@ -8,14 +8,15 @@
     <p:sldId id="256" r:id="rId2"/>
     <p:sldId id="257" r:id="rId3"/>
     <p:sldId id="258" r:id="rId4"/>
-    <p:sldId id="259" r:id="rId5"/>
-    <p:sldId id="260" r:id="rId6"/>
-    <p:sldId id="261" r:id="rId7"/>
-    <p:sldId id="262" r:id="rId8"/>
-    <p:sldId id="263" r:id="rId9"/>
-    <p:sldId id="264" r:id="rId10"/>
-    <p:sldId id="265" r:id="rId11"/>
-    <p:sldId id="266" r:id="rId12"/>
+    <p:sldId id="267" r:id="rId5"/>
+    <p:sldId id="259" r:id="rId6"/>
+    <p:sldId id="260" r:id="rId7"/>
+    <p:sldId id="261" r:id="rId8"/>
+    <p:sldId id="262" r:id="rId9"/>
+    <p:sldId id="263" r:id="rId10"/>
+    <p:sldId id="264" r:id="rId11"/>
+    <p:sldId id="265" r:id="rId12"/>
+    <p:sldId id="266" r:id="rId13"/>
   </p:sldIdLst>
   <p:sldSz cx="12192000" cy="6858000"/>
   <p:notesSz cx="6858000" cy="9144000"/>
@@ -6550,7 +6551,7 @@
           <a:p>
             <a:fld id="{53BEF823-48A5-43FC-BE03-E79964288B41}" type="datetimeFigureOut">
               <a:rPr lang="en-US" smtClean="0"/>
-              <a:t>10/14/2024</a:t>
+              <a:t>10/15/2024</a:t>
             </a:fld>
             <a:endParaRPr lang="en-US" dirty="0"/>
           </a:p>
@@ -6761,7 +6762,7 @@
             <a:fld id="{53BEF823-48A5-43FC-BE03-E79964288B41}" type="datetimeFigureOut">
               <a:rPr lang="en-US" smtClean="0"/>
               <a:pPr algn="r"/>
-              <a:t>10/14/2024</a:t>
+              <a:t>10/15/2024</a:t>
             </a:fld>
             <a:endParaRPr lang="en-US" dirty="0"/>
           </a:p>
@@ -6976,7 +6977,7 @@
             <a:fld id="{53BEF823-48A5-43FC-BE03-E79964288B41}" type="datetimeFigureOut">
               <a:rPr lang="en-US" smtClean="0"/>
               <a:pPr algn="r"/>
-              <a:t>10/14/2024</a:t>
+              <a:t>10/15/2024</a:t>
             </a:fld>
             <a:endParaRPr lang="en-US" dirty="0"/>
           </a:p>
@@ -7179,7 +7180,7 @@
             <a:fld id="{53BEF823-48A5-43FC-BE03-E79964288B41}" type="datetimeFigureOut">
               <a:rPr lang="en-US" smtClean="0"/>
               <a:pPr algn="r"/>
-              <a:t>10/14/2024</a:t>
+              <a:t>10/15/2024</a:t>
             </a:fld>
             <a:endParaRPr lang="en-US" dirty="0"/>
           </a:p>
@@ -7463,7 +7464,7 @@
             <a:fld id="{53BEF823-48A5-43FC-BE03-E79964288B41}" type="datetimeFigureOut">
               <a:rPr lang="en-US" smtClean="0"/>
               <a:pPr algn="r"/>
-              <a:t>10/14/2024</a:t>
+              <a:t>10/15/2024</a:t>
             </a:fld>
             <a:endParaRPr lang="en-US" dirty="0"/>
           </a:p>
@@ -7707,7 +7708,7 @@
             <a:fld id="{53BEF823-48A5-43FC-BE03-E79964288B41}" type="datetimeFigureOut">
               <a:rPr lang="en-US" smtClean="0"/>
               <a:pPr algn="r"/>
-              <a:t>10/14/2024</a:t>
+              <a:t>10/15/2024</a:t>
             </a:fld>
             <a:endParaRPr lang="en-US" dirty="0"/>
           </a:p>
@@ -8150,7 +8151,7 @@
             <a:fld id="{53BEF823-48A5-43FC-BE03-E79964288B41}" type="datetimeFigureOut">
               <a:rPr lang="en-US" smtClean="0"/>
               <a:pPr algn="r"/>
-              <a:t>10/14/2024</a:t>
+              <a:t>10/15/2024</a:t>
             </a:fld>
             <a:endParaRPr lang="en-US" dirty="0"/>
           </a:p>
@@ -8296,7 +8297,7 @@
             <a:fld id="{53BEF823-48A5-43FC-BE03-E79964288B41}" type="datetimeFigureOut">
               <a:rPr lang="en-US" smtClean="0"/>
               <a:pPr algn="r"/>
-              <a:t>10/14/2024</a:t>
+              <a:t>10/15/2024</a:t>
             </a:fld>
             <a:endParaRPr lang="en-US" dirty="0"/>
           </a:p>
@@ -8414,7 +8415,7 @@
             <a:fld id="{53BEF823-48A5-43FC-BE03-E79964288B41}" type="datetimeFigureOut">
               <a:rPr lang="en-US" smtClean="0"/>
               <a:pPr algn="r"/>
-              <a:t>10/14/2024</a:t>
+              <a:t>10/15/2024</a:t>
             </a:fld>
             <a:endParaRPr lang="en-US" dirty="0"/>
           </a:p>
@@ -8698,7 +8699,7 @@
             <a:fld id="{53BEF823-48A5-43FC-BE03-E79964288B41}" type="datetimeFigureOut">
               <a:rPr lang="en-US" smtClean="0"/>
               <a:pPr algn="r"/>
-              <a:t>10/14/2024</a:t>
+              <a:t>10/15/2024</a:t>
             </a:fld>
             <a:endParaRPr lang="en-US" dirty="0"/>
           </a:p>
@@ -8993,7 +8994,7 @@
             <a:fld id="{53BEF823-48A5-43FC-BE03-E79964288B41}" type="datetimeFigureOut">
               <a:rPr lang="en-US" smtClean="0"/>
               <a:pPr algn="r"/>
-              <a:t>10/14/2024</a:t>
+              <a:t>10/15/2024</a:t>
             </a:fld>
             <a:endParaRPr lang="en-US" dirty="0"/>
           </a:p>
@@ -9488,7 +9489,7 @@
             <a:fld id="{53BEF823-48A5-43FC-BE03-E79964288B41}" type="datetimeFigureOut">
               <a:rPr lang="en-US" smtClean="0"/>
               <a:pPr algn="r"/>
-              <a:t>10/14/2024</a:t>
+              <a:t>10/15/2024</a:t>
             </a:fld>
             <a:endParaRPr lang="en-US" dirty="0"/>
           </a:p>
@@ -10810,6 +10811,190 @@
         <p:cNvPr id="1" name="">
           <a:extLst>
             <a:ext uri="{FF2B5EF4-FFF2-40B4-BE49-F238E27FC236}">
+              <a16:creationId xmlns:a16="http://schemas.microsoft.com/office/drawing/2014/main" id="{AD064C19-78AB-14E8-FA92-AA9BFADC982E}"/>
+            </a:ext>
+          </a:extLst>
+        </p:cNvPr>
+        <p:cNvGrpSpPr/>
+        <p:nvPr/>
+      </p:nvGrpSpPr>
+      <p:grpSpPr>
+        <a:xfrm>
+          <a:off x="0" y="0"/>
+          <a:ext cx="0" cy="0"/>
+          <a:chOff x="0" y="0"/>
+          <a:chExt cx="0" cy="0"/>
+        </a:xfrm>
+      </p:grpSpPr>
+      <p:sp>
+        <p:nvSpPr>
+          <p:cNvPr id="2" name="Title 1">
+            <a:extLst>
+              <a:ext uri="{FF2B5EF4-FFF2-40B4-BE49-F238E27FC236}">
+                <a16:creationId xmlns:a16="http://schemas.microsoft.com/office/drawing/2014/main" id="{2FA18048-EF44-2703-447D-266CAD124D16}"/>
+              </a:ext>
+            </a:extLst>
+          </p:cNvPr>
+          <p:cNvSpPr>
+            <a:spLocks noGrp="1"/>
+          </p:cNvSpPr>
+          <p:nvPr>
+            <p:ph type="title"/>
+          </p:nvPr>
+        </p:nvSpPr>
+        <p:spPr>
+          <a:xfrm>
+            <a:off x="758952" y="758952"/>
+            <a:ext cx="10671048" cy="1128214"/>
+          </a:xfrm>
+        </p:spPr>
+        <p:txBody>
+          <a:bodyPr>
+            <a:normAutofit/>
+          </a:bodyPr>
+          <a:lstStyle/>
+          <a:p>
+            <a:r>
+              <a:rPr lang="en-US" dirty="0"/>
+              <a:t>Discussion</a:t>
+            </a:r>
+          </a:p>
+        </p:txBody>
+      </p:sp>
+      <p:sp>
+        <p:nvSpPr>
+          <p:cNvPr id="3" name="Content Placeholder 2">
+            <a:extLst>
+              <a:ext uri="{FF2B5EF4-FFF2-40B4-BE49-F238E27FC236}">
+                <a16:creationId xmlns:a16="http://schemas.microsoft.com/office/drawing/2014/main" id="{438EA165-09A7-29D3-523B-E960317B98E7}"/>
+              </a:ext>
+            </a:extLst>
+          </p:cNvPr>
+          <p:cNvSpPr>
+            <a:spLocks noGrp="1"/>
+          </p:cNvSpPr>
+          <p:nvPr>
+            <p:ph idx="1"/>
+          </p:nvPr>
+        </p:nvSpPr>
+        <p:spPr>
+          <a:xfrm>
+            <a:off x="758952" y="1887166"/>
+            <a:ext cx="10671048" cy="4445540"/>
+          </a:xfrm>
+        </p:spPr>
+        <p:txBody>
+          <a:bodyPr>
+            <a:normAutofit/>
+          </a:bodyPr>
+          <a:lstStyle/>
+          <a:p>
+            <a:r>
+              <a:rPr lang="en-US" dirty="0"/>
+              <a:t>Unable to reach goal accuracy of at least 70% with just weather-related features</a:t>
+            </a:r>
+          </a:p>
+          <a:p>
+            <a:pPr marL="468630" lvl="1" indent="-285750">
+              <a:buFont typeface="Arial" panose="020B0604020202020204" pitchFamily="34" charset="0"/>
+              <a:buChar char="•"/>
+            </a:pPr>
+            <a:r>
+              <a:rPr lang="en-US" i="0" dirty="0"/>
+              <a:t>Severity is gauged by impact on traffic</a:t>
+            </a:r>
+          </a:p>
+          <a:p>
+            <a:pPr marL="468630" lvl="1" indent="-285750">
+              <a:buFont typeface="Arial" panose="020B0604020202020204" pitchFamily="34" charset="0"/>
+              <a:buChar char="•"/>
+            </a:pPr>
+            <a:r>
+              <a:rPr lang="en-US" i="0" dirty="0"/>
+              <a:t>While severe weather is associated with motor vehicle accidents, it may not be strongly associated with traffic impact</a:t>
+            </a:r>
+          </a:p>
+          <a:p>
+            <a:pPr marL="468630" lvl="1" indent="-285750">
+              <a:buFont typeface="Arial" panose="020B0604020202020204" pitchFamily="34" charset="0"/>
+              <a:buChar char="•"/>
+            </a:pPr>
+            <a:r>
+              <a:rPr lang="en-US" i="0" dirty="0"/>
+              <a:t>	For example, there are typically less drivers on the road during severe weather</a:t>
+            </a:r>
+          </a:p>
+          <a:p>
+            <a:pPr marL="468630" lvl="1" indent="-285750">
+              <a:buFont typeface="Arial" panose="020B0604020202020204" pitchFamily="34" charset="0"/>
+              <a:buChar char="•"/>
+            </a:pPr>
+            <a:r>
+              <a:rPr lang="en-US" i="0" dirty="0"/>
+              <a:t>Beneficial features would’ve included speed limit, driver impairment, and number of vehicles involved in the accident</a:t>
+            </a:r>
+          </a:p>
+          <a:p>
+            <a:pPr marL="468630" lvl="1" indent="-285750">
+              <a:buFont typeface="Arial" panose="020B0604020202020204" pitchFamily="34" charset="0"/>
+              <a:buChar char="•"/>
+            </a:pPr>
+            <a:r>
+              <a:rPr lang="en-US" i="0" dirty="0"/>
+              <a:t>Please note: adding columns relevant to road structures did not change model accuracy</a:t>
+            </a:r>
+          </a:p>
+          <a:p>
+            <a:r>
+              <a:rPr lang="en-US" dirty="0"/>
+              <a:t>Random Forest with Cross Validation produced an accuracy of 78.17% with Duration_Minutes</a:t>
+            </a:r>
+          </a:p>
+          <a:p>
+            <a:pPr marL="468630" lvl="1" indent="-285750">
+              <a:buFont typeface="Arial" panose="020B0604020202020204" pitchFamily="34" charset="0"/>
+              <a:buChar char="•"/>
+            </a:pPr>
+            <a:r>
+              <a:rPr lang="en-US" i="0" dirty="0"/>
+              <a:t>Also produces more false positives than false negatives, as hoped</a:t>
+            </a:r>
+          </a:p>
+          <a:p>
+            <a:endParaRPr lang="en-US" dirty="0"/>
+          </a:p>
+          <a:p>
+            <a:endParaRPr lang="en-US" dirty="0"/>
+          </a:p>
+          <a:p>
+            <a:endParaRPr lang="en-US" dirty="0"/>
+          </a:p>
+          <a:p>
+            <a:endParaRPr lang="en-US" dirty="0"/>
+          </a:p>
+        </p:txBody>
+      </p:sp>
+    </p:spTree>
+    <p:extLst>
+      <p:ext uri="{BB962C8B-B14F-4D97-AF65-F5344CB8AC3E}">
+        <p14:creationId xmlns:p14="http://schemas.microsoft.com/office/powerpoint/2010/main" val="350018429"/>
+      </p:ext>
+    </p:extLst>
+  </p:cSld>
+  <p:clrMapOvr>
+    <a:masterClrMapping/>
+  </p:clrMapOvr>
+</p:sld>
+</file>
+
+<file path=ppt/slides/slide11.xml><?xml version="1.0" encoding="utf-8"?>
+<p:sld xmlns:a="http://schemas.openxmlformats.org/drawingml/2006/main" xmlns:r="http://schemas.openxmlformats.org/officeDocument/2006/relationships" xmlns:p="http://schemas.openxmlformats.org/presentationml/2006/main">
+  <p:cSld>
+    <p:spTree>
+      <p:nvGrpSpPr>
+        <p:cNvPr id="1" name="">
+          <a:extLst>
+            <a:ext uri="{FF2B5EF4-FFF2-40B4-BE49-F238E27FC236}">
               <a16:creationId xmlns:a16="http://schemas.microsoft.com/office/drawing/2014/main" id="{3C7DA21B-4655-18BF-84C2-719888061345}"/>
             </a:ext>
           </a:extLst>
@@ -10987,7 +11172,7 @@
 </p:sld>
 </file>
 
-<file path=ppt/slides/slide11.xml><?xml version="1.0" encoding="utf-8"?>
+<file path=ppt/slides/slide12.xml><?xml version="1.0" encoding="utf-8"?>
 <p:sld xmlns:a="http://schemas.openxmlformats.org/drawingml/2006/main" xmlns:r="http://schemas.openxmlformats.org/officeDocument/2006/relationships" xmlns:p="http://schemas.openxmlformats.org/presentationml/2006/main">
   <p:cSld>
     <p:bg>
@@ -12363,7 +12548,7 @@
             <p:ph idx="1"/>
             <p:extLst>
               <p:ext uri="{D42A27DB-BD31-4B8C-83A1-F6EECF244321}">
-                <p14:modId xmlns:p14="http://schemas.microsoft.com/office/powerpoint/2010/main" val="129022695"/>
+                <p14:modId xmlns:p14="http://schemas.microsoft.com/office/powerpoint/2010/main" val="3493239424"/>
               </p:ext>
             </p:extLst>
           </p:nvPr>
@@ -12930,7 +13115,19 @@
                         <a:rPr lang="en-US" sz="700" kern="100" dirty="0">
                           <a:effectLst/>
                         </a:rPr>
-                        <a:t>The severity of the data, ranging from 1 (least impact on traffic) to 4 (significant impact on traffic).</a:t>
+                        <a:t>The severity of </a:t>
+                      </a:r>
+                      <a:r>
+                        <a:rPr lang="en-US" sz="700" kern="100">
+                          <a:effectLst/>
+                        </a:rPr>
+                        <a:t>the accident, </a:t>
+                      </a:r>
+                      <a:r>
+                        <a:rPr lang="en-US" sz="700" kern="100" dirty="0">
+                          <a:effectLst/>
+                        </a:rPr>
+                        <a:t>ranging from 1 (least impact on traffic) to 4 (significant impact on traffic).</a:t>
                       </a:r>
                       <a:endParaRPr lang="en-US" sz="700" kern="100" dirty="0">
                         <a:effectLst/>
@@ -18771,6 +18968,840 @@
 </file>
 
 <file path=ppt/slides/slide4.xml><?xml version="1.0" encoding="utf-8"?>
+<p:sld xmlns:a="http://schemas.openxmlformats.org/drawingml/2006/main" xmlns:r="http://schemas.openxmlformats.org/officeDocument/2006/relationships" xmlns:p="http://schemas.openxmlformats.org/presentationml/2006/main">
+  <p:cSld>
+    <p:bg>
+      <p:bgPr>
+        <a:solidFill>
+          <a:schemeClr val="bg1"/>
+        </a:solidFill>
+        <a:effectLst/>
+      </p:bgPr>
+    </p:bg>
+    <p:spTree>
+      <p:nvGrpSpPr>
+        <p:cNvPr id="1" name=""/>
+        <p:cNvGrpSpPr/>
+        <p:nvPr/>
+      </p:nvGrpSpPr>
+      <p:grpSpPr>
+        <a:xfrm>
+          <a:off x="0" y="0"/>
+          <a:ext cx="0" cy="0"/>
+          <a:chOff x="0" y="0"/>
+          <a:chExt cx="0" cy="0"/>
+        </a:xfrm>
+      </p:grpSpPr>
+      <p:sp>
+        <p:nvSpPr>
+          <p:cNvPr id="10" name="Freeform 6">
+            <a:extLst>
+              <a:ext uri="{FF2B5EF4-FFF2-40B4-BE49-F238E27FC236}">
+                <a16:creationId xmlns:a16="http://schemas.microsoft.com/office/drawing/2014/main" id="{72411438-92A5-42B0-9C54-EA4FB32ACB5E}"/>
+              </a:ext>
+              <a:ext uri="{C183D7F6-B498-43B3-948B-1728B52AA6E4}">
+                <adec:decorative xmlns:adec="http://schemas.microsoft.com/office/drawing/2017/decorative" val="1"/>
+              </a:ext>
+            </a:extLst>
+          </p:cNvPr>
+          <p:cNvSpPr>
+            <a:spLocks noGrp="1" noRot="1" noChangeAspect="1" noMove="1" noResize="1" noEditPoints="1" noAdjustHandles="1" noChangeArrowheads="1" noChangeShapeType="1" noTextEdit="1"/>
+          </p:cNvSpPr>
+          <p:nvPr>
+            <p:extLst>
+              <p:ext uri="{386F3935-93C4-4BCD-93E2-E3B085C9AB24}">
+                <p16:designElem xmlns:p16="http://schemas.microsoft.com/office/powerpoint/2015/main" val="1"/>
+              </p:ext>
+            </p:extLst>
+          </p:nvPr>
+        </p:nvSpPr>
+        <p:spPr bwMode="auto">
+          <a:xfrm>
+            <a:off x="11784011" y="5778801"/>
+            <a:ext cx="407988" cy="819150"/>
+          </a:xfrm>
+          <a:custGeom>
+            <a:avLst/>
+            <a:gdLst/>
+            <a:ahLst/>
+            <a:cxnLst/>
+            <a:rect l="0" t="0" r="r" b="b"/>
+            <a:pathLst>
+              <a:path w="1799" h="3612">
+                <a:moveTo>
+                  <a:pt x="1799" y="0"/>
+                </a:moveTo>
+                <a:lnTo>
+                  <a:pt x="1799" y="3612"/>
+                </a:lnTo>
+                <a:lnTo>
+                  <a:pt x="1686" y="3609"/>
+                </a:lnTo>
+                <a:lnTo>
+                  <a:pt x="1574" y="3598"/>
+                </a:lnTo>
+                <a:lnTo>
+                  <a:pt x="1464" y="3581"/>
+                </a:lnTo>
+                <a:lnTo>
+                  <a:pt x="1357" y="3557"/>
+                </a:lnTo>
+                <a:lnTo>
+                  <a:pt x="1251" y="3527"/>
+                </a:lnTo>
+                <a:lnTo>
+                  <a:pt x="1150" y="3490"/>
+                </a:lnTo>
+                <a:lnTo>
+                  <a:pt x="1050" y="3448"/>
+                </a:lnTo>
+                <a:lnTo>
+                  <a:pt x="953" y="3401"/>
+                </a:lnTo>
+                <a:lnTo>
+                  <a:pt x="860" y="3347"/>
+                </a:lnTo>
+                <a:lnTo>
+                  <a:pt x="771" y="3289"/>
+                </a:lnTo>
+                <a:lnTo>
+                  <a:pt x="686" y="3224"/>
+                </a:lnTo>
+                <a:lnTo>
+                  <a:pt x="604" y="3156"/>
+                </a:lnTo>
+                <a:lnTo>
+                  <a:pt x="527" y="3083"/>
+                </a:lnTo>
+                <a:lnTo>
+                  <a:pt x="454" y="3005"/>
+                </a:lnTo>
+                <a:lnTo>
+                  <a:pt x="386" y="2923"/>
+                </a:lnTo>
+                <a:lnTo>
+                  <a:pt x="323" y="2838"/>
+                </a:lnTo>
+                <a:lnTo>
+                  <a:pt x="265" y="2748"/>
+                </a:lnTo>
+                <a:lnTo>
+                  <a:pt x="211" y="2655"/>
+                </a:lnTo>
+                <a:lnTo>
+                  <a:pt x="163" y="2559"/>
+                </a:lnTo>
+                <a:lnTo>
+                  <a:pt x="121" y="2459"/>
+                </a:lnTo>
+                <a:lnTo>
+                  <a:pt x="85" y="2356"/>
+                </a:lnTo>
+                <a:lnTo>
+                  <a:pt x="55" y="2251"/>
+                </a:lnTo>
+                <a:lnTo>
+                  <a:pt x="32" y="2143"/>
+                </a:lnTo>
+                <a:lnTo>
+                  <a:pt x="14" y="2033"/>
+                </a:lnTo>
+                <a:lnTo>
+                  <a:pt x="4" y="1920"/>
+                </a:lnTo>
+                <a:lnTo>
+                  <a:pt x="0" y="1806"/>
+                </a:lnTo>
+                <a:lnTo>
+                  <a:pt x="4" y="1692"/>
+                </a:lnTo>
+                <a:lnTo>
+                  <a:pt x="14" y="1580"/>
+                </a:lnTo>
+                <a:lnTo>
+                  <a:pt x="32" y="1469"/>
+                </a:lnTo>
+                <a:lnTo>
+                  <a:pt x="55" y="1362"/>
+                </a:lnTo>
+                <a:lnTo>
+                  <a:pt x="85" y="1256"/>
+                </a:lnTo>
+                <a:lnTo>
+                  <a:pt x="121" y="1154"/>
+                </a:lnTo>
+                <a:lnTo>
+                  <a:pt x="163" y="1054"/>
+                </a:lnTo>
+                <a:lnTo>
+                  <a:pt x="211" y="958"/>
+                </a:lnTo>
+                <a:lnTo>
+                  <a:pt x="265" y="864"/>
+                </a:lnTo>
+                <a:lnTo>
+                  <a:pt x="323" y="774"/>
+                </a:lnTo>
+                <a:lnTo>
+                  <a:pt x="386" y="689"/>
+                </a:lnTo>
+                <a:lnTo>
+                  <a:pt x="454" y="607"/>
+                </a:lnTo>
+                <a:lnTo>
+                  <a:pt x="527" y="529"/>
+                </a:lnTo>
+                <a:lnTo>
+                  <a:pt x="604" y="456"/>
+                </a:lnTo>
+                <a:lnTo>
+                  <a:pt x="686" y="388"/>
+                </a:lnTo>
+                <a:lnTo>
+                  <a:pt x="771" y="325"/>
+                </a:lnTo>
+                <a:lnTo>
+                  <a:pt x="860" y="266"/>
+                </a:lnTo>
+                <a:lnTo>
+                  <a:pt x="953" y="212"/>
+                </a:lnTo>
+                <a:lnTo>
+                  <a:pt x="1050" y="164"/>
+                </a:lnTo>
+                <a:lnTo>
+                  <a:pt x="1150" y="122"/>
+                </a:lnTo>
+                <a:lnTo>
+                  <a:pt x="1251" y="85"/>
+                </a:lnTo>
+                <a:lnTo>
+                  <a:pt x="1357" y="55"/>
+                </a:lnTo>
+                <a:lnTo>
+                  <a:pt x="1464" y="32"/>
+                </a:lnTo>
+                <a:lnTo>
+                  <a:pt x="1574" y="14"/>
+                </a:lnTo>
+                <a:lnTo>
+                  <a:pt x="1686" y="5"/>
+                </a:lnTo>
+                <a:lnTo>
+                  <a:pt x="1799" y="0"/>
+                </a:lnTo>
+                <a:close/>
+              </a:path>
+            </a:pathLst>
+          </a:custGeom>
+          <a:solidFill>
+            <a:schemeClr val="tx1">
+              <a:lumMod val="85000"/>
+              <a:lumOff val="15000"/>
+            </a:schemeClr>
+          </a:solidFill>
+          <a:ln w="0">
+            <a:noFill/>
+            <a:prstDash val="solid"/>
+            <a:round/>
+            <a:headEnd/>
+            <a:tailEnd/>
+          </a:ln>
+        </p:spPr>
+        <p:txBody>
+          <a:bodyPr anchor="ctr"/>
+          <a:lstStyle/>
+          <a:p>
+            <a:endParaRPr lang="en-US"/>
+          </a:p>
+        </p:txBody>
+      </p:sp>
+      <p:sp useBgFill="1">
+        <p:nvSpPr>
+          <p:cNvPr id="12" name="Rectangle 11">
+            <a:extLst>
+              <a:ext uri="{FF2B5EF4-FFF2-40B4-BE49-F238E27FC236}">
+                <a16:creationId xmlns:a16="http://schemas.microsoft.com/office/drawing/2014/main" id="{10C9A191-62EE-4A86-8FF9-6794BC3C58A7}"/>
+              </a:ext>
+              <a:ext uri="{C183D7F6-B498-43B3-948B-1728B52AA6E4}">
+                <adec:decorative xmlns:adec="http://schemas.microsoft.com/office/drawing/2017/decorative" val="1"/>
+              </a:ext>
+            </a:extLst>
+          </p:cNvPr>
+          <p:cNvSpPr>
+            <a:spLocks noGrp="1" noRot="1" noChangeAspect="1" noMove="1" noResize="1" noEditPoints="1" noAdjustHandles="1" noChangeArrowheads="1" noChangeShapeType="1" noTextEdit="1"/>
+          </p:cNvSpPr>
+          <p:nvPr>
+            <p:extLst>
+              <p:ext uri="{386F3935-93C4-4BCD-93E2-E3B085C9AB24}">
+                <p16:designElem xmlns:p16="http://schemas.microsoft.com/office/powerpoint/2015/main" val="1"/>
+              </p:ext>
+            </p:extLst>
+          </p:nvPr>
+        </p:nvSpPr>
+        <p:spPr>
+          <a:xfrm>
+            <a:off x="1" y="0"/>
+            <a:ext cx="12191999" cy="6858000"/>
+          </a:xfrm>
+          <a:prstGeom prst="rect">
+            <a:avLst/>
+          </a:prstGeom>
+          <a:ln>
+            <a:noFill/>
+          </a:ln>
+        </p:spPr>
+        <p:style>
+          <a:lnRef idx="2">
+            <a:schemeClr val="accent1">
+              <a:shade val="50000"/>
+            </a:schemeClr>
+          </a:lnRef>
+          <a:fillRef idx="1">
+            <a:schemeClr val="accent1"/>
+          </a:fillRef>
+          <a:effectRef idx="0">
+            <a:schemeClr val="accent1"/>
+          </a:effectRef>
+          <a:fontRef idx="minor">
+            <a:schemeClr val="lt1"/>
+          </a:fontRef>
+        </p:style>
+        <p:txBody>
+          <a:bodyPr rtlCol="0" anchor="ctr"/>
+          <a:lstStyle/>
+          <a:p>
+            <a:pPr algn="ctr"/>
+            <a:endParaRPr lang="en-US"/>
+          </a:p>
+        </p:txBody>
+      </p:sp>
+      <p:pic>
+        <p:nvPicPr>
+          <p:cNvPr id="6" name="Picture 5" descr="Digital financial graph">
+            <a:extLst>
+              <a:ext uri="{FF2B5EF4-FFF2-40B4-BE49-F238E27FC236}">
+                <a16:creationId xmlns:a16="http://schemas.microsoft.com/office/drawing/2014/main" id="{7727AC51-7D68-CCA9-8753-16047F18DB22}"/>
+              </a:ext>
+            </a:extLst>
+          </p:cNvPr>
+          <p:cNvPicPr>
+            <a:picLocks noChangeAspect="1"/>
+          </p:cNvPicPr>
+          <p:nvPr/>
+        </p:nvPicPr>
+        <p:blipFill>
+          <a:blip r:embed="rId2">
+            <a:duotone>
+              <a:schemeClr val="bg2">
+                <a:shade val="45000"/>
+                <a:satMod val="135000"/>
+              </a:schemeClr>
+              <a:prstClr val="white"/>
+            </a:duotone>
+            <a:alphaModFix amt="40000"/>
+          </a:blip>
+          <a:srcRect/>
+          <a:stretch/>
+        </p:blipFill>
+        <p:spPr>
+          <a:xfrm>
+            <a:off x="20" y="10"/>
+            <a:ext cx="12191980" cy="6857990"/>
+          </a:xfrm>
+          <a:prstGeom prst="rect">
+            <a:avLst/>
+          </a:prstGeom>
+        </p:spPr>
+      </p:pic>
+      <p:sp>
+        <p:nvSpPr>
+          <p:cNvPr id="14" name="Rectangle 13">
+            <a:extLst>
+              <a:ext uri="{FF2B5EF4-FFF2-40B4-BE49-F238E27FC236}">
+                <a16:creationId xmlns:a16="http://schemas.microsoft.com/office/drawing/2014/main" id="{6222F81D-28CB-42CB-9961-602C33F65295}"/>
+              </a:ext>
+              <a:ext uri="{C183D7F6-B498-43B3-948B-1728B52AA6E4}">
+                <adec:decorative xmlns:adec="http://schemas.microsoft.com/office/drawing/2017/decorative" val="1"/>
+              </a:ext>
+            </a:extLst>
+          </p:cNvPr>
+          <p:cNvSpPr>
+            <a:spLocks noGrp="1" noRot="1" noChangeAspect="1" noMove="1" noResize="1" noEditPoints="1" noAdjustHandles="1" noChangeArrowheads="1" noChangeShapeType="1" noTextEdit="1"/>
+          </p:cNvSpPr>
+          <p:nvPr>
+            <p:extLst>
+              <p:ext uri="{386F3935-93C4-4BCD-93E2-E3B085C9AB24}">
+                <p16:designElem xmlns:p16="http://schemas.microsoft.com/office/powerpoint/2015/main" val="1"/>
+              </p:ext>
+            </p:extLst>
+          </p:nvPr>
+        </p:nvSpPr>
+        <p:spPr bwMode="grayWhite">
+          <a:xfrm>
+            <a:off x="0" y="0"/>
+            <a:ext cx="12191999" cy="6858000"/>
+          </a:xfrm>
+          <a:prstGeom prst="rect">
+            <a:avLst/>
+          </a:prstGeom>
+          <a:solidFill>
+            <a:schemeClr val="bg2">
+              <a:alpha val="60000"/>
+            </a:schemeClr>
+          </a:solidFill>
+          <a:ln>
+            <a:noFill/>
+          </a:ln>
+        </p:spPr>
+        <p:style>
+          <a:lnRef idx="2">
+            <a:schemeClr val="accent1">
+              <a:shade val="50000"/>
+            </a:schemeClr>
+          </a:lnRef>
+          <a:fillRef idx="1">
+            <a:schemeClr val="accent1"/>
+          </a:fillRef>
+          <a:effectRef idx="0">
+            <a:schemeClr val="accent1"/>
+          </a:effectRef>
+          <a:fontRef idx="minor">
+            <a:schemeClr val="lt1"/>
+          </a:fontRef>
+        </p:style>
+        <p:txBody>
+          <a:bodyPr rtlCol="0" anchor="ctr"/>
+          <a:lstStyle/>
+          <a:p>
+            <a:pPr algn="ctr"/>
+            <a:endParaRPr lang="en-US"/>
+          </a:p>
+        </p:txBody>
+      </p:sp>
+      <p:sp>
+        <p:nvSpPr>
+          <p:cNvPr id="4" name="Title 3">
+            <a:extLst>
+              <a:ext uri="{FF2B5EF4-FFF2-40B4-BE49-F238E27FC236}">
+                <a16:creationId xmlns:a16="http://schemas.microsoft.com/office/drawing/2014/main" id="{C777A1DA-FC3E-FEB9-CE9A-684A845B9F78}"/>
+              </a:ext>
+            </a:extLst>
+          </p:cNvPr>
+          <p:cNvSpPr>
+            <a:spLocks noGrp="1"/>
+          </p:cNvSpPr>
+          <p:nvPr>
+            <p:ph type="title"/>
+          </p:nvPr>
+        </p:nvSpPr>
+        <p:spPr>
+          <a:xfrm>
+            <a:off x="758952" y="1201002"/>
+            <a:ext cx="3831335" cy="4312829"/>
+          </a:xfrm>
+        </p:spPr>
+        <p:txBody>
+          <a:bodyPr vert="horz" lIns="91440" tIns="45720" rIns="91440" bIns="45720" rtlCol="0" anchor="t">
+            <a:normAutofit/>
+          </a:bodyPr>
+          <a:lstStyle/>
+          <a:p>
+            <a:r>
+              <a:rPr lang="en-US" i="1" kern="1200" spc="100" baseline="0">
+                <a:solidFill>
+                  <a:schemeClr val="tx1">
+                    <a:lumMod val="85000"/>
+                    <a:lumOff val="15000"/>
+                  </a:schemeClr>
+                </a:solidFill>
+                <a:latin typeface="+mj-lt"/>
+                <a:ea typeface="+mj-ea"/>
+                <a:cs typeface="+mj-cs"/>
+              </a:rPr>
+              <a:t>Data Preparation – Data Sampling</a:t>
+            </a:r>
+          </a:p>
+        </p:txBody>
+      </p:sp>
+      <p:cxnSp>
+        <p:nvCxnSpPr>
+          <p:cNvPr id="16" name="Straight Connector 15">
+            <a:extLst>
+              <a:ext uri="{FF2B5EF4-FFF2-40B4-BE49-F238E27FC236}">
+                <a16:creationId xmlns:a16="http://schemas.microsoft.com/office/drawing/2014/main" id="{081E1E49-F752-49CA-BFF6-1303B0A8AA03}"/>
+              </a:ext>
+              <a:ext uri="{C183D7F6-B498-43B3-948B-1728B52AA6E4}">
+                <adec:decorative xmlns:adec="http://schemas.microsoft.com/office/drawing/2017/decorative" val="1"/>
+              </a:ext>
+            </a:extLst>
+          </p:cNvPr>
+          <p:cNvCxnSpPr>
+            <a:cxnSpLocks noGrp="1" noRot="1" noChangeAspect="1" noMove="1" noResize="1" noEditPoints="1" noAdjustHandles="1" noChangeArrowheads="1" noChangeShapeType="1"/>
+          </p:cNvCxnSpPr>
+          <p:nvPr>
+            <p:extLst>
+              <p:ext uri="{386F3935-93C4-4BCD-93E2-E3B085C9AB24}">
+                <p16:designElem xmlns:p16="http://schemas.microsoft.com/office/powerpoint/2015/main" val="1"/>
+              </p:ext>
+            </p:extLst>
+          </p:nvPr>
+        </p:nvCxnSpPr>
+        <p:spPr>
+          <a:xfrm>
+            <a:off x="4912021" y="1143293"/>
+            <a:ext cx="0" cy="5714707"/>
+          </a:xfrm>
+          <a:prstGeom prst="line">
+            <a:avLst/>
+          </a:prstGeom>
+          <a:ln w="19050">
+            <a:solidFill>
+              <a:schemeClr val="tx1"/>
+            </a:solidFill>
+          </a:ln>
+        </p:spPr>
+        <p:style>
+          <a:lnRef idx="1">
+            <a:schemeClr val="accent1"/>
+          </a:lnRef>
+          <a:fillRef idx="0">
+            <a:schemeClr val="accent1"/>
+          </a:fillRef>
+          <a:effectRef idx="0">
+            <a:schemeClr val="accent1"/>
+          </a:effectRef>
+          <a:fontRef idx="minor">
+            <a:schemeClr val="tx1"/>
+          </a:fontRef>
+        </p:style>
+      </p:cxnSp>
+      <p:sp>
+        <p:nvSpPr>
+          <p:cNvPr id="2" name="Content Placeholder 1">
+            <a:extLst>
+              <a:ext uri="{FF2B5EF4-FFF2-40B4-BE49-F238E27FC236}">
+                <a16:creationId xmlns:a16="http://schemas.microsoft.com/office/drawing/2014/main" id="{6D27361A-7965-6CB0-174B-C1288E9ACC01}"/>
+              </a:ext>
+            </a:extLst>
+          </p:cNvPr>
+          <p:cNvSpPr>
+            <a:spLocks noGrp="1"/>
+          </p:cNvSpPr>
+          <p:nvPr>
+            <p:ph sz="half" idx="1"/>
+          </p:nvPr>
+        </p:nvSpPr>
+        <p:spPr>
+          <a:xfrm>
+            <a:off x="5232992" y="1201002"/>
+            <a:ext cx="6197007" cy="4312829"/>
+          </a:xfrm>
+        </p:spPr>
+        <p:txBody>
+          <a:bodyPr vert="horz" lIns="91440" tIns="45720" rIns="91440" bIns="45720" rtlCol="0">
+            <a:normAutofit fontScale="92500" lnSpcReduction="10000"/>
+          </a:bodyPr>
+          <a:lstStyle/>
+          <a:p>
+            <a:r>
+              <a:rPr lang="en-US" dirty="0"/>
+              <a:t>The data used in this project was a 10,000-row sample derived from the 500,000-row sampled dataset available on Kaggle</a:t>
+            </a:r>
+          </a:p>
+          <a:p>
+            <a:pPr lvl="1" indent="-285750">
+              <a:buFont typeface="Arial" panose="020B0604020202020204" pitchFamily="34" charset="0"/>
+              <a:buChar char="•"/>
+            </a:pPr>
+            <a:r>
+              <a:rPr lang="en-US" i="0" dirty="0"/>
+              <a:t>Had to be small enough to run on local machine</a:t>
+            </a:r>
+          </a:p>
+          <a:p>
+            <a:pPr marL="0" indent="0">
+              <a:buNone/>
+            </a:pPr>
+            <a:r>
+              <a:rPr lang="en-US" b="1" dirty="0"/>
+              <a:t>Required some preparation:</a:t>
+            </a:r>
+          </a:p>
+          <a:p>
+            <a:r>
+              <a:rPr lang="en-US" dirty="0"/>
+              <a:t>Removed rows containing any missing data</a:t>
+            </a:r>
+          </a:p>
+          <a:p>
+            <a:r>
+              <a:rPr lang="en-US" dirty="0"/>
+              <a:t>Data was imbalanced, required oversampling to ensure severity data was equally distributed</a:t>
+            </a:r>
+          </a:p>
+          <a:p>
+            <a:pPr lvl="1" indent="-285750">
+              <a:buFont typeface="Arial" panose="020B0604020202020204" pitchFamily="34" charset="0"/>
+              <a:buChar char="•"/>
+            </a:pPr>
+            <a:r>
+              <a:rPr lang="en-US" i="0" dirty="0"/>
+              <a:t>Oversampled minority class (severe accidents) as there   were significantly more non-severe accidents</a:t>
+            </a:r>
+          </a:p>
+          <a:p>
+            <a:r>
+              <a:rPr lang="en-US" dirty="0"/>
+              <a:t>5,049 non-severe accidents, and 4,951 severe accidents</a:t>
+            </a:r>
+          </a:p>
+          <a:p>
+            <a:endParaRPr lang="en-US" dirty="0"/>
+          </a:p>
+          <a:p>
+            <a:endParaRPr lang="en-US" dirty="0"/>
+          </a:p>
+        </p:txBody>
+      </p:sp>
+      <p:sp>
+        <p:nvSpPr>
+          <p:cNvPr id="18" name="Freeform 6">
+            <a:extLst>
+              <a:ext uri="{FF2B5EF4-FFF2-40B4-BE49-F238E27FC236}">
+                <a16:creationId xmlns:a16="http://schemas.microsoft.com/office/drawing/2014/main" id="{4E75910E-4112-4447-8981-4CA7ACEF94BA}"/>
+              </a:ext>
+              <a:ext uri="{C183D7F6-B498-43B3-948B-1728B52AA6E4}">
+                <adec:decorative xmlns:adec="http://schemas.microsoft.com/office/drawing/2017/decorative" val="1"/>
+              </a:ext>
+            </a:extLst>
+          </p:cNvPr>
+          <p:cNvSpPr>
+            <a:spLocks noGrp="1" noRot="1" noChangeAspect="1" noMove="1" noResize="1" noEditPoints="1" noAdjustHandles="1" noChangeArrowheads="1" noChangeShapeType="1" noTextEdit="1"/>
+          </p:cNvSpPr>
+          <p:nvPr>
+            <p:extLst>
+              <p:ext uri="{386F3935-93C4-4BCD-93E2-E3B085C9AB24}">
+                <p16:designElem xmlns:p16="http://schemas.microsoft.com/office/powerpoint/2015/main" val="1"/>
+              </p:ext>
+            </p:extLst>
+          </p:nvPr>
+        </p:nvSpPr>
+        <p:spPr bwMode="auto">
+          <a:xfrm>
+            <a:off x="11784011" y="5783564"/>
+            <a:ext cx="407988" cy="819150"/>
+          </a:xfrm>
+          <a:custGeom>
+            <a:avLst/>
+            <a:gdLst/>
+            <a:ahLst/>
+            <a:cxnLst/>
+            <a:rect l="0" t="0" r="r" b="b"/>
+            <a:pathLst>
+              <a:path w="1799" h="3612">
+                <a:moveTo>
+                  <a:pt x="1799" y="0"/>
+                </a:moveTo>
+                <a:lnTo>
+                  <a:pt x="1799" y="3612"/>
+                </a:lnTo>
+                <a:lnTo>
+                  <a:pt x="1686" y="3609"/>
+                </a:lnTo>
+                <a:lnTo>
+                  <a:pt x="1574" y="3598"/>
+                </a:lnTo>
+                <a:lnTo>
+                  <a:pt x="1464" y="3581"/>
+                </a:lnTo>
+                <a:lnTo>
+                  <a:pt x="1357" y="3557"/>
+                </a:lnTo>
+                <a:lnTo>
+                  <a:pt x="1251" y="3527"/>
+                </a:lnTo>
+                <a:lnTo>
+                  <a:pt x="1150" y="3490"/>
+                </a:lnTo>
+                <a:lnTo>
+                  <a:pt x="1050" y="3448"/>
+                </a:lnTo>
+                <a:lnTo>
+                  <a:pt x="953" y="3401"/>
+                </a:lnTo>
+                <a:lnTo>
+                  <a:pt x="860" y="3347"/>
+                </a:lnTo>
+                <a:lnTo>
+                  <a:pt x="771" y="3289"/>
+                </a:lnTo>
+                <a:lnTo>
+                  <a:pt x="686" y="3224"/>
+                </a:lnTo>
+                <a:lnTo>
+                  <a:pt x="604" y="3156"/>
+                </a:lnTo>
+                <a:lnTo>
+                  <a:pt x="527" y="3083"/>
+                </a:lnTo>
+                <a:lnTo>
+                  <a:pt x="454" y="3005"/>
+                </a:lnTo>
+                <a:lnTo>
+                  <a:pt x="386" y="2923"/>
+                </a:lnTo>
+                <a:lnTo>
+                  <a:pt x="323" y="2838"/>
+                </a:lnTo>
+                <a:lnTo>
+                  <a:pt x="265" y="2748"/>
+                </a:lnTo>
+                <a:lnTo>
+                  <a:pt x="211" y="2655"/>
+                </a:lnTo>
+                <a:lnTo>
+                  <a:pt x="163" y="2559"/>
+                </a:lnTo>
+                <a:lnTo>
+                  <a:pt x="121" y="2459"/>
+                </a:lnTo>
+                <a:lnTo>
+                  <a:pt x="85" y="2356"/>
+                </a:lnTo>
+                <a:lnTo>
+                  <a:pt x="55" y="2251"/>
+                </a:lnTo>
+                <a:lnTo>
+                  <a:pt x="32" y="2143"/>
+                </a:lnTo>
+                <a:lnTo>
+                  <a:pt x="14" y="2033"/>
+                </a:lnTo>
+                <a:lnTo>
+                  <a:pt x="4" y="1920"/>
+                </a:lnTo>
+                <a:lnTo>
+                  <a:pt x="0" y="1806"/>
+                </a:lnTo>
+                <a:lnTo>
+                  <a:pt x="4" y="1692"/>
+                </a:lnTo>
+                <a:lnTo>
+                  <a:pt x="14" y="1580"/>
+                </a:lnTo>
+                <a:lnTo>
+                  <a:pt x="32" y="1469"/>
+                </a:lnTo>
+                <a:lnTo>
+                  <a:pt x="55" y="1362"/>
+                </a:lnTo>
+                <a:lnTo>
+                  <a:pt x="85" y="1256"/>
+                </a:lnTo>
+                <a:lnTo>
+                  <a:pt x="121" y="1154"/>
+                </a:lnTo>
+                <a:lnTo>
+                  <a:pt x="163" y="1054"/>
+                </a:lnTo>
+                <a:lnTo>
+                  <a:pt x="211" y="958"/>
+                </a:lnTo>
+                <a:lnTo>
+                  <a:pt x="265" y="864"/>
+                </a:lnTo>
+                <a:lnTo>
+                  <a:pt x="323" y="774"/>
+                </a:lnTo>
+                <a:lnTo>
+                  <a:pt x="386" y="689"/>
+                </a:lnTo>
+                <a:lnTo>
+                  <a:pt x="454" y="607"/>
+                </a:lnTo>
+                <a:lnTo>
+                  <a:pt x="527" y="529"/>
+                </a:lnTo>
+                <a:lnTo>
+                  <a:pt x="604" y="456"/>
+                </a:lnTo>
+                <a:lnTo>
+                  <a:pt x="686" y="388"/>
+                </a:lnTo>
+                <a:lnTo>
+                  <a:pt x="771" y="325"/>
+                </a:lnTo>
+                <a:lnTo>
+                  <a:pt x="860" y="266"/>
+                </a:lnTo>
+                <a:lnTo>
+                  <a:pt x="953" y="212"/>
+                </a:lnTo>
+                <a:lnTo>
+                  <a:pt x="1050" y="164"/>
+                </a:lnTo>
+                <a:lnTo>
+                  <a:pt x="1150" y="122"/>
+                </a:lnTo>
+                <a:lnTo>
+                  <a:pt x="1251" y="85"/>
+                </a:lnTo>
+                <a:lnTo>
+                  <a:pt x="1357" y="55"/>
+                </a:lnTo>
+                <a:lnTo>
+                  <a:pt x="1464" y="32"/>
+                </a:lnTo>
+                <a:lnTo>
+                  <a:pt x="1574" y="14"/>
+                </a:lnTo>
+                <a:lnTo>
+                  <a:pt x="1686" y="5"/>
+                </a:lnTo>
+                <a:lnTo>
+                  <a:pt x="1799" y="0"/>
+                </a:lnTo>
+                <a:close/>
+              </a:path>
+            </a:pathLst>
+          </a:custGeom>
+          <a:solidFill>
+            <a:schemeClr val="tx1">
+              <a:lumMod val="85000"/>
+              <a:lumOff val="15000"/>
+            </a:schemeClr>
+          </a:solidFill>
+          <a:ln w="0">
+            <a:noFill/>
+            <a:prstDash val="solid"/>
+            <a:round/>
+            <a:headEnd/>
+            <a:tailEnd/>
+          </a:ln>
+        </p:spPr>
+        <p:txBody>
+          <a:bodyPr anchor="ctr"/>
+          <a:lstStyle/>
+          <a:p>
+            <a:endParaRPr lang="en-US"/>
+          </a:p>
+        </p:txBody>
+      </p:sp>
+    </p:spTree>
+    <p:extLst>
+      <p:ext uri="{BB962C8B-B14F-4D97-AF65-F5344CB8AC3E}">
+        <p14:creationId xmlns:p14="http://schemas.microsoft.com/office/powerpoint/2010/main" val="1727737789"/>
+      </p:ext>
+    </p:extLst>
+  </p:cSld>
+  <p:clrMapOvr>
+    <a:overrideClrMapping bg1="dk1" tx1="lt1" bg2="dk2" tx2="lt2" accent1="accent1" accent2="accent2" accent3="accent3" accent4="accent4" accent5="accent5" accent6="accent6" hlink="hlink" folHlink="folHlink"/>
+  </p:clrMapOvr>
+</p:sld>
+</file>
+
+<file path=ppt/slides/slide5.xml><?xml version="1.0" encoding="utf-8"?>
 <p:sld xmlns:a="http://schemas.openxmlformats.org/drawingml/2006/main" xmlns:r="http://schemas.openxmlformats.org/officeDocument/2006/relationships" xmlns:p="http://schemas.openxmlformats.org/presentationml/2006/main">
   <p:cSld>
     <p:bg>
@@ -19016,17 +20047,6 @@
             </a:pPr>
             <a:r>
               <a:rPr lang="en-US" sz="1100" dirty="0"/>
-              <a:t>Removed rows containing any missing data</a:t>
-            </a:r>
-          </a:p>
-          <a:p>
-            <a:pPr>
-              <a:lnSpc>
-                <a:spcPct val="100000"/>
-              </a:lnSpc>
-            </a:pPr>
-            <a:r>
-              <a:rPr lang="en-US" sz="1100" dirty="0"/>
               <a:t>Transformed Severity into a binary target variable (non-severe: 0, severe: 1)</a:t>
             </a:r>
           </a:p>
@@ -19346,7 +20366,7 @@
 </p:sld>
 </file>
 
-<file path=ppt/slides/slide5.xml><?xml version="1.0" encoding="utf-8"?>
+<file path=ppt/slides/slide6.xml><?xml version="1.0" encoding="utf-8"?>
 <p:sld xmlns:a="http://schemas.openxmlformats.org/drawingml/2006/main" xmlns:r="http://schemas.openxmlformats.org/officeDocument/2006/relationships" xmlns:p="http://schemas.openxmlformats.org/presentationml/2006/main">
   <p:cSld>
     <p:bg>
@@ -19792,7 +20812,7 @@
 </p:sld>
 </file>
 
-<file path=ppt/slides/slide6.xml><?xml version="1.0" encoding="utf-8"?>
+<file path=ppt/slides/slide7.xml><?xml version="1.0" encoding="utf-8"?>
 <p:sld xmlns:a="http://schemas.openxmlformats.org/drawingml/2006/main" xmlns:r="http://schemas.openxmlformats.org/officeDocument/2006/relationships" xmlns:p="http://schemas.openxmlformats.org/presentationml/2006/main">
   <p:cSld>
     <p:bg>
@@ -20467,7 +21487,7 @@
 </p:sld>
 </file>
 
-<file path=ppt/slides/slide7.xml><?xml version="1.0" encoding="utf-8"?>
+<file path=ppt/slides/slide8.xml><?xml version="1.0" encoding="utf-8"?>
 <p:sld xmlns:a="http://schemas.openxmlformats.org/drawingml/2006/main" xmlns:r="http://schemas.openxmlformats.org/officeDocument/2006/relationships" xmlns:p="http://schemas.openxmlformats.org/presentationml/2006/main">
   <p:cSld>
     <p:spTree>
@@ -22755,7 +23775,7 @@
 </p:sld>
 </file>
 
-<file path=ppt/slides/slide8.xml><?xml version="1.0" encoding="utf-8"?>
+<file path=ppt/slides/slide9.xml><?xml version="1.0" encoding="utf-8"?>
 <p:sld xmlns:a="http://schemas.openxmlformats.org/drawingml/2006/main" xmlns:r="http://schemas.openxmlformats.org/officeDocument/2006/relationships" xmlns:p="http://schemas.openxmlformats.org/presentationml/2006/main">
   <p:cSld>
     <p:spTree>
@@ -25049,190 +26069,6 @@
 </p:sld>
 </file>
 
-<file path=ppt/slides/slide9.xml><?xml version="1.0" encoding="utf-8"?>
-<p:sld xmlns:a="http://schemas.openxmlformats.org/drawingml/2006/main" xmlns:r="http://schemas.openxmlformats.org/officeDocument/2006/relationships" xmlns:p="http://schemas.openxmlformats.org/presentationml/2006/main">
-  <p:cSld>
-    <p:spTree>
-      <p:nvGrpSpPr>
-        <p:cNvPr id="1" name="">
-          <a:extLst>
-            <a:ext uri="{FF2B5EF4-FFF2-40B4-BE49-F238E27FC236}">
-              <a16:creationId xmlns:a16="http://schemas.microsoft.com/office/drawing/2014/main" id="{AD064C19-78AB-14E8-FA92-AA9BFADC982E}"/>
-            </a:ext>
-          </a:extLst>
-        </p:cNvPr>
-        <p:cNvGrpSpPr/>
-        <p:nvPr/>
-      </p:nvGrpSpPr>
-      <p:grpSpPr>
-        <a:xfrm>
-          <a:off x="0" y="0"/>
-          <a:ext cx="0" cy="0"/>
-          <a:chOff x="0" y="0"/>
-          <a:chExt cx="0" cy="0"/>
-        </a:xfrm>
-      </p:grpSpPr>
-      <p:sp>
-        <p:nvSpPr>
-          <p:cNvPr id="2" name="Title 1">
-            <a:extLst>
-              <a:ext uri="{FF2B5EF4-FFF2-40B4-BE49-F238E27FC236}">
-                <a16:creationId xmlns:a16="http://schemas.microsoft.com/office/drawing/2014/main" id="{2FA18048-EF44-2703-447D-266CAD124D16}"/>
-              </a:ext>
-            </a:extLst>
-          </p:cNvPr>
-          <p:cNvSpPr>
-            <a:spLocks noGrp="1"/>
-          </p:cNvSpPr>
-          <p:nvPr>
-            <p:ph type="title"/>
-          </p:nvPr>
-        </p:nvSpPr>
-        <p:spPr>
-          <a:xfrm>
-            <a:off x="758952" y="758952"/>
-            <a:ext cx="10671048" cy="1128214"/>
-          </a:xfrm>
-        </p:spPr>
-        <p:txBody>
-          <a:bodyPr>
-            <a:normAutofit/>
-          </a:bodyPr>
-          <a:lstStyle/>
-          <a:p>
-            <a:r>
-              <a:rPr lang="en-US" dirty="0"/>
-              <a:t>Discussion</a:t>
-            </a:r>
-          </a:p>
-        </p:txBody>
-      </p:sp>
-      <p:sp>
-        <p:nvSpPr>
-          <p:cNvPr id="3" name="Content Placeholder 2">
-            <a:extLst>
-              <a:ext uri="{FF2B5EF4-FFF2-40B4-BE49-F238E27FC236}">
-                <a16:creationId xmlns:a16="http://schemas.microsoft.com/office/drawing/2014/main" id="{438EA165-09A7-29D3-523B-E960317B98E7}"/>
-              </a:ext>
-            </a:extLst>
-          </p:cNvPr>
-          <p:cNvSpPr>
-            <a:spLocks noGrp="1"/>
-          </p:cNvSpPr>
-          <p:nvPr>
-            <p:ph idx="1"/>
-          </p:nvPr>
-        </p:nvSpPr>
-        <p:spPr>
-          <a:xfrm>
-            <a:off x="758952" y="1887166"/>
-            <a:ext cx="10671048" cy="4445540"/>
-          </a:xfrm>
-        </p:spPr>
-        <p:txBody>
-          <a:bodyPr>
-            <a:normAutofit/>
-          </a:bodyPr>
-          <a:lstStyle/>
-          <a:p>
-            <a:r>
-              <a:rPr lang="en-US" dirty="0"/>
-              <a:t>Unable to reach goal accuracy of at least 70% with just weather-related features</a:t>
-            </a:r>
-          </a:p>
-          <a:p>
-            <a:pPr marL="468630" lvl="1" indent="-285750">
-              <a:buFont typeface="Arial" panose="020B0604020202020204" pitchFamily="34" charset="0"/>
-              <a:buChar char="•"/>
-            </a:pPr>
-            <a:r>
-              <a:rPr lang="en-US" i="0" dirty="0"/>
-              <a:t>Severity is gauged by impact on traffic</a:t>
-            </a:r>
-          </a:p>
-          <a:p>
-            <a:pPr marL="468630" lvl="1" indent="-285750">
-              <a:buFont typeface="Arial" panose="020B0604020202020204" pitchFamily="34" charset="0"/>
-              <a:buChar char="•"/>
-            </a:pPr>
-            <a:r>
-              <a:rPr lang="en-US" i="0" dirty="0"/>
-              <a:t>While severe weather is associated with motor vehicle accidents, it may not be strongly associated with traffic impact</a:t>
-            </a:r>
-          </a:p>
-          <a:p>
-            <a:pPr marL="468630" lvl="1" indent="-285750">
-              <a:buFont typeface="Arial" panose="020B0604020202020204" pitchFamily="34" charset="0"/>
-              <a:buChar char="•"/>
-            </a:pPr>
-            <a:r>
-              <a:rPr lang="en-US" i="0" dirty="0"/>
-              <a:t>	For example, there are typically less drivers on the road during severe weather</a:t>
-            </a:r>
-          </a:p>
-          <a:p>
-            <a:pPr marL="468630" lvl="1" indent="-285750">
-              <a:buFont typeface="Arial" panose="020B0604020202020204" pitchFamily="34" charset="0"/>
-              <a:buChar char="•"/>
-            </a:pPr>
-            <a:r>
-              <a:rPr lang="en-US" i="0" dirty="0"/>
-              <a:t>Beneficial features would’ve included speed limit, driver impairment, and number of vehicles involved in the accident</a:t>
-            </a:r>
-          </a:p>
-          <a:p>
-            <a:pPr marL="468630" lvl="1" indent="-285750">
-              <a:buFont typeface="Arial" panose="020B0604020202020204" pitchFamily="34" charset="0"/>
-              <a:buChar char="•"/>
-            </a:pPr>
-            <a:r>
-              <a:rPr lang="en-US" i="0" dirty="0"/>
-              <a:t>Please note: adding columns relevant to road structures did not change model accuracy</a:t>
-            </a:r>
-          </a:p>
-          <a:p>
-            <a:r>
-              <a:rPr lang="en-US" dirty="0"/>
-              <a:t>Random Forest with Cross Validation produced an accuracy of 78.17% with Duration_Minutes</a:t>
-            </a:r>
-          </a:p>
-          <a:p>
-            <a:pPr marL="468630" lvl="1" indent="-285750">
-              <a:buFont typeface="Arial" panose="020B0604020202020204" pitchFamily="34" charset="0"/>
-              <a:buChar char="•"/>
-            </a:pPr>
-            <a:r>
-              <a:rPr lang="en-US" i="0" dirty="0"/>
-              <a:t>Also produces more false positives than false negatives, as hoped</a:t>
-            </a:r>
-          </a:p>
-          <a:p>
-            <a:endParaRPr lang="en-US" dirty="0"/>
-          </a:p>
-          <a:p>
-            <a:endParaRPr lang="en-US" dirty="0"/>
-          </a:p>
-          <a:p>
-            <a:endParaRPr lang="en-US" dirty="0"/>
-          </a:p>
-          <a:p>
-            <a:endParaRPr lang="en-US" dirty="0"/>
-          </a:p>
-        </p:txBody>
-      </p:sp>
-    </p:spTree>
-    <p:extLst>
-      <p:ext uri="{BB962C8B-B14F-4D97-AF65-F5344CB8AC3E}">
-        <p14:creationId xmlns:p14="http://schemas.microsoft.com/office/powerpoint/2010/main" val="350018429"/>
-      </p:ext>
-    </p:extLst>
-  </p:cSld>
-  <p:clrMapOvr>
-    <a:masterClrMapping/>
-  </p:clrMapOvr>
-</p:sld>
-</file>
-
 <file path=ppt/theme/theme1.xml><?xml version="1.0" encoding="utf-8"?>
 <a:theme xmlns:a="http://schemas.openxmlformats.org/drawingml/2006/main" name="HeadlinesVTI">
   <a:themeElements>

</xml_diff>